<commit_message>
new file, no template
</commit_message>
<xml_diff>
--- a/conferences/2024-ATIA/[Handout-ATIA] - Design Inclusive Digital Experiences, Involve People with Disabilities.pptx
+++ b/conferences/2024-ATIA/[Handout-ATIA] - Design Inclusive Digital Experiences, Involve People with Disabilities.pptx
@@ -3379,7 +3379,7 @@
       </p:sp>
       <p:pic>
         <p:nvPicPr>
-          <p:cNvPr id="4" name="Picture 3" descr="A black background with white text&#10;&#10;Description automatically generated">
+          <p:cNvPr id="4" name="Picture 3" descr="RHONDA WEISS CENTER">
             <a:extLst>
               <a:ext uri="{FF2B5EF4-FFF2-40B4-BE49-F238E27FC236}">
                 <a16:creationId xmlns:a16="http://schemas.microsoft.com/office/drawing/2014/main" id="{597BB684-0D91-94D4-DA49-384611327BCC}"/>
@@ -3405,7 +3405,7 @@
         </p:blipFill>
         <p:spPr>
           <a:xfrm>
-            <a:off x="3098028" y="5109937"/>
+            <a:off x="960309" y="908640"/>
             <a:ext cx="4127500" cy="800100"/>
           </a:xfrm>
           <a:prstGeom prst="rect">

</xml_diff>